<commit_message>
visualisation and presentation updated
</commit_message>
<xml_diff>
--- a/project3_DataCleaning.pptx
+++ b/project3_DataCleaning.pptx
@@ -17,6 +17,11 @@
     <p:sldId id="264" r:id="rId12"/>
     <p:sldId id="265" r:id="rId13"/>
     <p:sldId id="266" r:id="rId14"/>
+    <p:sldId id="267" r:id="rId15"/>
+    <p:sldId id="268" r:id="rId16"/>
+    <p:sldId id="269" r:id="rId17"/>
+    <p:sldId id="270" r:id="rId18"/>
+    <p:sldId id="271" r:id="rId19"/>
   </p:sldIdLst>
   <p:sldSz cx="12192000" cy="6858000"/>
   <p:notesSz cx="7559675" cy="10691812"/>
@@ -3229,7 +3234,7 @@
         <p:spPr>
           <a:xfrm>
             <a:off x="91440" y="1005840"/>
-            <a:ext cx="11887200" cy="3291840"/>
+            <a:ext cx="11886840" cy="3291480"/>
           </a:xfrm>
           <a:prstGeom prst="rect">
             <a:avLst/>
@@ -3351,7 +3356,7 @@
         <p:spPr>
           <a:xfrm>
             <a:off x="4857120" y="6257520"/>
-            <a:ext cx="7230240" cy="663480"/>
+            <a:ext cx="7229880" cy="663120"/>
           </a:xfrm>
           <a:prstGeom prst="rect">
             <a:avLst/>
@@ -3400,7 +3405,7 @@
         <p:spPr>
           <a:xfrm>
             <a:off x="-182880" y="-91440"/>
-            <a:ext cx="6562440" cy="941760"/>
+            <a:ext cx="6562080" cy="941400"/>
           </a:xfrm>
           <a:prstGeom prst="rect">
             <a:avLst/>
@@ -3463,7 +3468,7 @@
         <p:spPr>
           <a:xfrm>
             <a:off x="294480" y="653760"/>
-            <a:ext cx="1899360" cy="1905840"/>
+            <a:ext cx="1899000" cy="1905480"/>
           </a:xfrm>
           <a:prstGeom prst="rect">
             <a:avLst/>
@@ -3524,14 +3529,14 @@
       </p:grpSpPr>
       <p:sp>
         <p:nvSpPr>
-          <p:cNvPr id="97" name="CustomShape 1"/>
+          <p:cNvPr id="94" name="CustomShape 1"/>
           <p:cNvSpPr/>
           <p:nvPr/>
         </p:nvSpPr>
         <p:spPr>
           <a:xfrm>
-            <a:off x="838080" y="365040"/>
-            <a:ext cx="10514160" cy="1324080"/>
+            <a:off x="99000" y="-249840"/>
+            <a:ext cx="10532880" cy="1362960"/>
           </a:xfrm>
           <a:prstGeom prst="rect">
             <a:avLst/>
@@ -3547,66 +3552,75 @@
           <a:effectRef idx="0"/>
           <a:fontRef idx="minor"/>
         </p:style>
-      </p:sp>
-      <p:sp>
-        <p:nvSpPr>
-          <p:cNvPr id="98" name="CustomShape 2"/>
-          <p:cNvSpPr/>
-          <p:nvPr/>
-        </p:nvSpPr>
-        <p:spPr>
-          <a:xfrm>
-            <a:off x="838080" y="1825560"/>
-            <a:ext cx="10514160" cy="4349880"/>
-          </a:xfrm>
-          <a:prstGeom prst="rect">
-            <a:avLst/>
-          </a:prstGeom>
-          <a:noFill/>
-          <a:ln>
-            <a:noFill/>
-          </a:ln>
-        </p:spPr>
-        <p:style>
-          <a:lnRef idx="0"/>
-          <a:fillRef idx="0"/>
-          <a:effectRef idx="0"/>
-          <a:fontRef idx="minor"/>
-        </p:style>
-        <p:txBody>
-          <a:bodyPr lIns="90000" rIns="90000" tIns="45000" bIns="45000">
-            <a:normAutofit/>
-          </a:bodyPr>
-          <a:p>
-            <a:pPr marL="228600" indent="-227160">
+        <p:txBody>
+          <a:bodyPr lIns="90000" rIns="90000" tIns="45000" bIns="45000" anchor="ctr">
+            <a:normAutofit/>
+          </a:bodyPr>
+          <a:p>
+            <a:pPr>
               <a:lnSpc>
                 <a:spcPct val="90000"/>
               </a:lnSpc>
-              <a:spcBef>
-                <a:spcPts val="1001"/>
-              </a:spcBef>
-              <a:buClr>
-                <a:srgbClr val="c00000"/>
-              </a:buClr>
-              <a:buFont typeface="Arial"/>
-              <a:buChar char="•"/>
             </a:pPr>
             <a:r>
-              <a:rPr b="1" lang="en-US" sz="8800" spc="-1" strike="noStrike">
+              <a:rPr b="1" lang="en-US" sz="3600" spc="-1" strike="noStrike">
                 <a:solidFill>
                   <a:srgbClr val="c00000"/>
                 </a:solidFill>
                 <a:latin typeface="Calibri"/>
                 <a:ea typeface="DejaVu Sans"/>
               </a:rPr>
-              <a:t>Questions</a:t>
+              <a:t>Data Visualization and Interpretation:</a:t>
             </a:r>
-            <a:endParaRPr b="0" lang="en-US" sz="8800" spc="-1" strike="noStrike">
-              <a:latin typeface="Arial"/>
-            </a:endParaRPr>
-          </a:p>
-        </p:txBody>
-      </p:sp>
+            <a:endParaRPr b="0" lang="en-US" sz="3600" spc="-1" strike="noStrike">
+              <a:latin typeface="Arial"/>
+            </a:endParaRPr>
+          </a:p>
+          <a:p>
+            <a:pPr>
+              <a:lnSpc>
+                <a:spcPct val="90000"/>
+              </a:lnSpc>
+            </a:pPr>
+            <a:r>
+              <a:rPr b="1" lang="en-US" sz="2400" spc="-1" strike="noStrike">
+                <a:solidFill>
+                  <a:srgbClr val="c00000"/>
+                </a:solidFill>
+                <a:latin typeface="Calibri"/>
+                <a:ea typeface="DejaVu Sans"/>
+              </a:rPr>
+              <a:t>Mean price by area</a:t>
+            </a:r>
+            <a:endParaRPr b="0" lang="en-US" sz="2400" spc="-1" strike="noStrike">
+              <a:latin typeface="Arial"/>
+            </a:endParaRPr>
+          </a:p>
+        </p:txBody>
+      </p:sp>
+      <p:pic>
+        <p:nvPicPr>
+          <p:cNvPr id="95" name="" descr=""/>
+          <p:cNvPicPr/>
+          <p:nvPr/>
+        </p:nvPicPr>
+        <p:blipFill>
+          <a:blip r:embed="rId1"/>
+          <a:stretch/>
+        </p:blipFill>
+        <p:spPr>
+          <a:xfrm>
+            <a:off x="1005840" y="1463040"/>
+            <a:ext cx="8467200" cy="4626000"/>
+          </a:xfrm>
+          <a:prstGeom prst="rect">
+            <a:avLst/>
+          </a:prstGeom>
+          <a:ln>
+            <a:noFill/>
+          </a:ln>
+        </p:spPr>
+      </p:pic>
     </p:spTree>
   </p:cSld>
   <p:timing>
@@ -3658,14 +3672,14 @@
       </p:grpSpPr>
       <p:sp>
         <p:nvSpPr>
-          <p:cNvPr id="99" name="CustomShape 1"/>
+          <p:cNvPr id="96" name="CustomShape 1"/>
           <p:cNvSpPr/>
           <p:nvPr/>
         </p:nvSpPr>
         <p:spPr>
           <a:xfrm>
-            <a:off x="838080" y="365040"/>
-            <a:ext cx="10514160" cy="1324080"/>
+            <a:off x="99000" y="-249840"/>
+            <a:ext cx="10532880" cy="1362960"/>
           </a:xfrm>
           <a:prstGeom prst="rect">
             <a:avLst/>
@@ -3681,17 +3695,822 @@
           <a:effectRef idx="0"/>
           <a:fontRef idx="minor"/>
         </p:style>
-      </p:sp>
-      <p:sp>
-        <p:nvSpPr>
-          <p:cNvPr id="100" name="CustomShape 2"/>
+        <p:txBody>
+          <a:bodyPr lIns="90000" rIns="90000" tIns="45000" bIns="45000" anchor="ctr">
+            <a:normAutofit/>
+          </a:bodyPr>
+          <a:p>
+            <a:pPr>
+              <a:lnSpc>
+                <a:spcPct val="90000"/>
+              </a:lnSpc>
+            </a:pPr>
+            <a:r>
+              <a:rPr b="1" lang="en-US" sz="3600" spc="-1" strike="noStrike">
+                <a:solidFill>
+                  <a:srgbClr val="c00000"/>
+                </a:solidFill>
+                <a:latin typeface="Calibri"/>
+                <a:ea typeface="DejaVu Sans"/>
+              </a:rPr>
+              <a:t>Data Visualization and Interpretation:</a:t>
+            </a:r>
+            <a:endParaRPr b="0" lang="en-US" sz="3600" spc="-1" strike="noStrike">
+              <a:latin typeface="Arial"/>
+            </a:endParaRPr>
+          </a:p>
+          <a:p>
+            <a:pPr>
+              <a:lnSpc>
+                <a:spcPct val="90000"/>
+              </a:lnSpc>
+            </a:pPr>
+            <a:r>
+              <a:rPr b="1" lang="en-US" sz="2400" spc="-1" strike="noStrike">
+                <a:solidFill>
+                  <a:srgbClr val="c00000"/>
+                </a:solidFill>
+                <a:latin typeface="Calibri"/>
+                <a:ea typeface="DejaVu Sans"/>
+              </a:rPr>
+              <a:t>Mean area-price per region</a:t>
+            </a:r>
+            <a:endParaRPr b="0" lang="en-US" sz="2400" spc="-1" strike="noStrike">
+              <a:latin typeface="Arial"/>
+            </a:endParaRPr>
+          </a:p>
+        </p:txBody>
+      </p:sp>
+      <p:pic>
+        <p:nvPicPr>
+          <p:cNvPr id="97" name="" descr=""/>
+          <p:cNvPicPr/>
+          <p:nvPr/>
+        </p:nvPicPr>
+        <p:blipFill>
+          <a:blip r:embed="rId1"/>
+          <a:stretch/>
+        </p:blipFill>
+        <p:spPr>
+          <a:xfrm>
+            <a:off x="1280160" y="1091880"/>
+            <a:ext cx="9418320" cy="4674240"/>
+          </a:xfrm>
+          <a:prstGeom prst="rect">
+            <a:avLst/>
+          </a:prstGeom>
+          <a:ln>
+            <a:noFill/>
+          </a:ln>
+        </p:spPr>
+      </p:pic>
+    </p:spTree>
+  </p:cSld>
+  <p:timing>
+    <p:tnLst>
+      <p:par>
+        <p:cTn id="21" dur="indefinite" restart="never" nodeType="tmRoot">
+          <p:childTnLst>
+            <p:seq>
+              <p:cTn id="22" dur="indefinite" nodeType="mainSeq"/>
+              <p:prevCondLst>
+                <p:cond delay="0" evt="onPrev">
+                  <p:tgtEl>
+                    <p:sldTgt/>
+                  </p:tgtEl>
+                </p:cond>
+              </p:prevCondLst>
+              <p:nextCondLst>
+                <p:cond delay="0" evt="onNext">
+                  <p:tgtEl>
+                    <p:sldTgt/>
+                  </p:tgtEl>
+                </p:cond>
+              </p:nextCondLst>
+            </p:seq>
+          </p:childTnLst>
+        </p:cTn>
+      </p:par>
+    </p:tnLst>
+  </p:timing>
+</p:sld>
+</file>
+
+<file path=ppt/slides/slide12.xml><?xml version="1.0" encoding="utf-8"?>
+<p:sld xmlns:a="http://schemas.openxmlformats.org/drawingml/2006/main" xmlns:p="http://schemas.openxmlformats.org/presentationml/2006/main" xmlns:r="http://schemas.openxmlformats.org/officeDocument/2006/relationships" xmlns:p14="http://schemas.microsoft.com/office/powerpoint/2010/main" xmlns:p15="http://schemas.microsoft.com/office/powerpoint/2012/main" xmlns:mc="http://schemas.openxmlformats.org/markup-compatibility/2006">
+  <p:cSld>
+    <p:spTree>
+      <p:nvGrpSpPr>
+        <p:cNvPr id="1" name=""/>
+        <p:cNvGrpSpPr/>
+        <p:nvPr/>
+      </p:nvGrpSpPr>
+      <p:grpSpPr>
+        <a:xfrm>
+          <a:off x="0" y="0"/>
+          <a:ext cx="0" cy="0"/>
+          <a:chOff x="0" y="0"/>
+          <a:chExt cx="0" cy="0"/>
+        </a:xfrm>
+      </p:grpSpPr>
+      <p:sp>
+        <p:nvSpPr>
+          <p:cNvPr id="98" name="CustomShape 1"/>
           <p:cNvSpPr/>
           <p:nvPr/>
         </p:nvSpPr>
         <p:spPr>
           <a:xfrm>
+            <a:off x="99000" y="-249840"/>
+            <a:ext cx="10532880" cy="1362960"/>
+          </a:xfrm>
+          <a:prstGeom prst="rect">
+            <a:avLst/>
+          </a:prstGeom>
+          <a:noFill/>
+          <a:ln>
+            <a:noFill/>
+          </a:ln>
+        </p:spPr>
+        <p:style>
+          <a:lnRef idx="0"/>
+          <a:fillRef idx="0"/>
+          <a:effectRef idx="0"/>
+          <a:fontRef idx="minor"/>
+        </p:style>
+        <p:txBody>
+          <a:bodyPr lIns="90000" rIns="90000" tIns="45000" bIns="45000" anchor="ctr">
+            <a:normAutofit/>
+          </a:bodyPr>
+          <a:p>
+            <a:pPr>
+              <a:lnSpc>
+                <a:spcPct val="90000"/>
+              </a:lnSpc>
+            </a:pPr>
+            <a:r>
+              <a:rPr b="1" lang="en-US" sz="3600" spc="-1" strike="noStrike">
+                <a:solidFill>
+                  <a:srgbClr val="c00000"/>
+                </a:solidFill>
+                <a:latin typeface="Calibri"/>
+                <a:ea typeface="DejaVu Sans"/>
+              </a:rPr>
+              <a:t>Data Visualization and Interpretation:</a:t>
+            </a:r>
+            <a:endParaRPr b="0" lang="en-US" sz="3600" spc="-1" strike="noStrike">
+              <a:latin typeface="Arial"/>
+            </a:endParaRPr>
+          </a:p>
+          <a:p>
+            <a:pPr>
+              <a:lnSpc>
+                <a:spcPct val="90000"/>
+              </a:lnSpc>
+            </a:pPr>
+            <a:r>
+              <a:rPr b="1" lang="en-US" sz="2400" spc="-1" strike="noStrike">
+                <a:solidFill>
+                  <a:srgbClr val="c00000"/>
+                </a:solidFill>
+                <a:latin typeface="Calibri"/>
+                <a:ea typeface="DejaVu Sans"/>
+              </a:rPr>
+              <a:t>Median price by area</a:t>
+            </a:r>
+            <a:endParaRPr b="0" lang="en-US" sz="2400" spc="-1" strike="noStrike">
+              <a:latin typeface="Arial"/>
+            </a:endParaRPr>
+          </a:p>
+        </p:txBody>
+      </p:sp>
+      <p:pic>
+        <p:nvPicPr>
+          <p:cNvPr id="99" name="" descr=""/>
+          <p:cNvPicPr/>
+          <p:nvPr/>
+        </p:nvPicPr>
+        <p:blipFill>
+          <a:blip r:embed="rId1"/>
+          <a:stretch/>
+        </p:blipFill>
+        <p:spPr>
+          <a:xfrm rot="11400">
+            <a:off x="2916720" y="890640"/>
+            <a:ext cx="5512320" cy="5566320"/>
+          </a:xfrm>
+          <a:prstGeom prst="rect">
+            <a:avLst/>
+          </a:prstGeom>
+          <a:ln>
+            <a:noFill/>
+          </a:ln>
+        </p:spPr>
+      </p:pic>
+    </p:spTree>
+  </p:cSld>
+  <p:timing>
+    <p:tnLst>
+      <p:par>
+        <p:cTn id="23" dur="indefinite" restart="never" nodeType="tmRoot">
+          <p:childTnLst>
+            <p:seq>
+              <p:cTn id="24" dur="indefinite" nodeType="mainSeq"/>
+              <p:prevCondLst>
+                <p:cond delay="0" evt="onPrev">
+                  <p:tgtEl>
+                    <p:sldTgt/>
+                  </p:tgtEl>
+                </p:cond>
+              </p:prevCondLst>
+              <p:nextCondLst>
+                <p:cond delay="0" evt="onNext">
+                  <p:tgtEl>
+                    <p:sldTgt/>
+                  </p:tgtEl>
+                </p:cond>
+              </p:nextCondLst>
+            </p:seq>
+          </p:childTnLst>
+        </p:cTn>
+      </p:par>
+    </p:tnLst>
+  </p:timing>
+</p:sld>
+</file>
+
+<file path=ppt/slides/slide13.xml><?xml version="1.0" encoding="utf-8"?>
+<p:sld xmlns:a="http://schemas.openxmlformats.org/drawingml/2006/main" xmlns:p="http://schemas.openxmlformats.org/presentationml/2006/main" xmlns:r="http://schemas.openxmlformats.org/officeDocument/2006/relationships" xmlns:p14="http://schemas.microsoft.com/office/powerpoint/2010/main" xmlns:p15="http://schemas.microsoft.com/office/powerpoint/2012/main" xmlns:mc="http://schemas.openxmlformats.org/markup-compatibility/2006">
+  <p:cSld>
+    <p:spTree>
+      <p:nvGrpSpPr>
+        <p:cNvPr id="1" name=""/>
+        <p:cNvGrpSpPr/>
+        <p:nvPr/>
+      </p:nvGrpSpPr>
+      <p:grpSpPr>
+        <a:xfrm>
+          <a:off x="0" y="0"/>
+          <a:ext cx="0" cy="0"/>
+          <a:chOff x="0" y="0"/>
+          <a:chExt cx="0" cy="0"/>
+        </a:xfrm>
+      </p:grpSpPr>
+      <p:sp>
+        <p:nvSpPr>
+          <p:cNvPr id="100" name="CustomShape 1"/>
+          <p:cNvSpPr/>
+          <p:nvPr/>
+        </p:nvSpPr>
+        <p:spPr>
+          <a:xfrm>
+            <a:off x="99000" y="-249840"/>
+            <a:ext cx="10532880" cy="1362960"/>
+          </a:xfrm>
+          <a:prstGeom prst="rect">
+            <a:avLst/>
+          </a:prstGeom>
+          <a:noFill/>
+          <a:ln>
+            <a:noFill/>
+          </a:ln>
+        </p:spPr>
+        <p:style>
+          <a:lnRef idx="0"/>
+          <a:fillRef idx="0"/>
+          <a:effectRef idx="0"/>
+          <a:fontRef idx="minor"/>
+        </p:style>
+        <p:txBody>
+          <a:bodyPr lIns="90000" rIns="90000" tIns="45000" bIns="45000" anchor="ctr">
+            <a:normAutofit/>
+          </a:bodyPr>
+          <a:p>
+            <a:pPr>
+              <a:lnSpc>
+                <a:spcPct val="90000"/>
+              </a:lnSpc>
+            </a:pPr>
+            <a:r>
+              <a:rPr b="1" lang="en-US" sz="3600" spc="-1" strike="noStrike">
+                <a:solidFill>
+                  <a:srgbClr val="c00000"/>
+                </a:solidFill>
+                <a:latin typeface="Calibri"/>
+                <a:ea typeface="DejaVu Sans"/>
+              </a:rPr>
+              <a:t>Data Visualization and Interpretation:</a:t>
+            </a:r>
+            <a:endParaRPr b="0" lang="en-US" sz="3600" spc="-1" strike="noStrike">
+              <a:latin typeface="Arial"/>
+            </a:endParaRPr>
+          </a:p>
+          <a:p>
+            <a:pPr>
+              <a:lnSpc>
+                <a:spcPct val="90000"/>
+              </a:lnSpc>
+            </a:pPr>
+            <a:r>
+              <a:rPr b="1" lang="en-US" sz="2400" spc="-1" strike="noStrike">
+                <a:solidFill>
+                  <a:srgbClr val="c00000"/>
+                </a:solidFill>
+                <a:latin typeface="Calibri"/>
+                <a:ea typeface="DejaVu Sans"/>
+              </a:rPr>
+              <a:t>Median price-by- per area region </a:t>
+            </a:r>
+            <a:endParaRPr b="0" lang="en-US" sz="2400" spc="-1" strike="noStrike">
+              <a:latin typeface="Arial"/>
+            </a:endParaRPr>
+          </a:p>
+        </p:txBody>
+      </p:sp>
+      <p:pic>
+        <p:nvPicPr>
+          <p:cNvPr id="101" name="" descr=""/>
+          <p:cNvPicPr/>
+          <p:nvPr/>
+        </p:nvPicPr>
+        <p:blipFill>
+          <a:blip r:embed="rId1"/>
+          <a:stretch/>
+        </p:blipFill>
+        <p:spPr>
+          <a:xfrm>
+            <a:off x="3004200" y="1554480"/>
+            <a:ext cx="5042520" cy="4674240"/>
+          </a:xfrm>
+          <a:prstGeom prst="rect">
+            <a:avLst/>
+          </a:prstGeom>
+          <a:ln>
+            <a:noFill/>
+          </a:ln>
+        </p:spPr>
+      </p:pic>
+    </p:spTree>
+  </p:cSld>
+  <p:timing>
+    <p:tnLst>
+      <p:par>
+        <p:cTn id="25" dur="indefinite" restart="never" nodeType="tmRoot">
+          <p:childTnLst>
+            <p:seq>
+              <p:cTn id="26" dur="indefinite" nodeType="mainSeq"/>
+              <p:prevCondLst>
+                <p:cond delay="0" evt="onPrev">
+                  <p:tgtEl>
+                    <p:sldTgt/>
+                  </p:tgtEl>
+                </p:cond>
+              </p:prevCondLst>
+              <p:nextCondLst>
+                <p:cond delay="0" evt="onNext">
+                  <p:tgtEl>
+                    <p:sldTgt/>
+                  </p:tgtEl>
+                </p:cond>
+              </p:nextCondLst>
+            </p:seq>
+          </p:childTnLst>
+        </p:cTn>
+      </p:par>
+    </p:tnLst>
+  </p:timing>
+</p:sld>
+</file>
+
+<file path=ppt/slides/slide14.xml><?xml version="1.0" encoding="utf-8"?>
+<p:sld xmlns:a="http://schemas.openxmlformats.org/drawingml/2006/main" xmlns:p="http://schemas.openxmlformats.org/presentationml/2006/main" xmlns:r="http://schemas.openxmlformats.org/officeDocument/2006/relationships" xmlns:p14="http://schemas.microsoft.com/office/powerpoint/2010/main" xmlns:p15="http://schemas.microsoft.com/office/powerpoint/2012/main" xmlns:mc="http://schemas.openxmlformats.org/markup-compatibility/2006">
+  <p:cSld>
+    <p:spTree>
+      <p:nvGrpSpPr>
+        <p:cNvPr id="1" name=""/>
+        <p:cNvGrpSpPr/>
+        <p:nvPr/>
+      </p:nvGrpSpPr>
+      <p:grpSpPr>
+        <a:xfrm>
+          <a:off x="0" y="0"/>
+          <a:ext cx="0" cy="0"/>
+          <a:chOff x="0" y="0"/>
+          <a:chExt cx="0" cy="0"/>
+        </a:xfrm>
+      </p:grpSpPr>
+      <p:sp>
+        <p:nvSpPr>
+          <p:cNvPr id="102" name="CustomShape 1"/>
+          <p:cNvSpPr/>
+          <p:nvPr/>
+        </p:nvSpPr>
+        <p:spPr>
+          <a:xfrm>
+            <a:off x="838080" y="365040"/>
+            <a:ext cx="10513800" cy="1323720"/>
+          </a:xfrm>
+          <a:prstGeom prst="rect">
+            <a:avLst/>
+          </a:prstGeom>
+          <a:noFill/>
+          <a:ln>
+            <a:noFill/>
+          </a:ln>
+        </p:spPr>
+        <p:style>
+          <a:lnRef idx="0"/>
+          <a:fillRef idx="0"/>
+          <a:effectRef idx="0"/>
+          <a:fontRef idx="minor"/>
+        </p:style>
+        <p:txBody>
+          <a:bodyPr lIns="90000" rIns="90000" tIns="45000" bIns="45000" anchor="ctr"/>
+          <a:p>
+            <a:pPr>
+              <a:lnSpc>
+                <a:spcPct val="90000"/>
+              </a:lnSpc>
+            </a:pPr>
+            <a:r>
+              <a:rPr b="1" lang="en-US" sz="4400" spc="-1" strike="noStrike">
+                <a:solidFill>
+                  <a:srgbClr val="c00000"/>
+                </a:solidFill>
+                <a:latin typeface="Calibri"/>
+                <a:ea typeface="DejaVu Sans"/>
+              </a:rPr>
+              <a:t>Conclusion:</a:t>
+            </a:r>
+            <a:endParaRPr b="0" lang="en-US" sz="4400" spc="-1" strike="noStrike">
+              <a:latin typeface="Arial"/>
+            </a:endParaRPr>
+          </a:p>
+          <a:p>
+            <a:pPr>
+              <a:lnSpc>
+                <a:spcPct val="90000"/>
+              </a:lnSpc>
+            </a:pPr>
+            <a:endParaRPr b="0" lang="en-US" sz="4400" spc="-1" strike="noStrike">
+              <a:latin typeface="Arial"/>
+            </a:endParaRPr>
+          </a:p>
+        </p:txBody>
+      </p:sp>
+      <p:sp>
+        <p:nvSpPr>
+          <p:cNvPr id="103" name="CustomShape 2"/>
+          <p:cNvSpPr/>
+          <p:nvPr/>
+        </p:nvSpPr>
+        <p:spPr>
+          <a:xfrm>
+            <a:off x="838080" y="1690560"/>
+            <a:ext cx="10513800" cy="4484520"/>
+          </a:xfrm>
+          <a:prstGeom prst="rect">
+            <a:avLst/>
+          </a:prstGeom>
+          <a:noFill/>
+          <a:ln>
+            <a:noFill/>
+          </a:ln>
+        </p:spPr>
+        <p:style>
+          <a:lnRef idx="0"/>
+          <a:fillRef idx="0"/>
+          <a:effectRef idx="0"/>
+          <a:fontRef idx="minor"/>
+        </p:style>
+        <p:txBody>
+          <a:bodyPr lIns="90000" rIns="90000" tIns="45000" bIns="45000"/>
+          <a:p>
+            <a:pPr marL="228600" indent="-226800">
+              <a:lnSpc>
+                <a:spcPct val="90000"/>
+              </a:lnSpc>
+              <a:spcBef>
+                <a:spcPts val="1001"/>
+              </a:spcBef>
+              <a:buClr>
+                <a:srgbClr val="000000"/>
+              </a:buClr>
+              <a:buFont typeface="Arial"/>
+              <a:buChar char="•"/>
+            </a:pPr>
+            <a:r>
+              <a:rPr b="1" lang="en-US" sz="2800" spc="-1" strike="noStrike">
+                <a:solidFill>
+                  <a:srgbClr val="000000"/>
+                </a:solidFill>
+                <a:latin typeface="Calibri"/>
+                <a:ea typeface="DejaVu Sans"/>
+              </a:rPr>
+              <a:t>Brussels is the most expensive region in Belgium for houses and apartment.  </a:t>
+            </a:r>
+            <a:r>
+              <a:rPr b="0" lang="en-US" sz="2800" spc="-1" strike="noStrike">
+                <a:solidFill>
+                  <a:srgbClr val="000000"/>
+                </a:solidFill>
+                <a:latin typeface="Calibri"/>
+                <a:ea typeface="DejaVu Sans"/>
+              </a:rPr>
+              <a:t>	</a:t>
+            </a:r>
+            <a:endParaRPr b="0" lang="en-US" sz="2800" spc="-1" strike="noStrike">
+              <a:latin typeface="Arial"/>
+            </a:endParaRPr>
+          </a:p>
+          <a:p>
+            <a:pPr>
+              <a:lnSpc>
+                <a:spcPct val="90000"/>
+              </a:lnSpc>
+              <a:spcBef>
+                <a:spcPts val="1001"/>
+              </a:spcBef>
+            </a:pPr>
+            <a:endParaRPr b="0" lang="en-US" sz="2800" spc="-1" strike="noStrike">
+              <a:latin typeface="Arial"/>
+            </a:endParaRPr>
+          </a:p>
+          <a:p>
+            <a:pPr marL="228600" indent="-226800">
+              <a:lnSpc>
+                <a:spcPct val="90000"/>
+              </a:lnSpc>
+              <a:spcBef>
+                <a:spcPts val="1001"/>
+              </a:spcBef>
+              <a:buClr>
+                <a:srgbClr val="000000"/>
+              </a:buClr>
+              <a:buFont typeface="Arial"/>
+              <a:buChar char="•"/>
+            </a:pPr>
+            <a:r>
+              <a:rPr b="0" lang="en-US" sz="2800" spc="-1" strike="noStrike">
+                <a:solidFill>
+                  <a:srgbClr val="000000"/>
+                </a:solidFill>
+                <a:latin typeface="Calibri"/>
+                <a:ea typeface="DejaVu Sans"/>
+              </a:rPr>
+              <a:t> </a:t>
+            </a:r>
+            <a:endParaRPr b="0" lang="en-US" sz="2800" spc="-1" strike="noStrike">
+              <a:latin typeface="Arial"/>
+            </a:endParaRPr>
+          </a:p>
+          <a:p>
+            <a:pPr>
+              <a:lnSpc>
+                <a:spcPct val="90000"/>
+              </a:lnSpc>
+              <a:spcBef>
+                <a:spcPts val="1001"/>
+              </a:spcBef>
+            </a:pPr>
+            <a:endParaRPr b="0" lang="en-US" sz="2800" spc="-1" strike="noStrike">
+              <a:latin typeface="Arial"/>
+            </a:endParaRPr>
+          </a:p>
+          <a:p>
+            <a:pPr>
+              <a:lnSpc>
+                <a:spcPct val="90000"/>
+              </a:lnSpc>
+              <a:spcBef>
+                <a:spcPts val="1001"/>
+              </a:spcBef>
+            </a:pPr>
+            <a:endParaRPr b="0" lang="en-US" sz="2800" spc="-1" strike="noStrike">
+              <a:latin typeface="Arial"/>
+            </a:endParaRPr>
+          </a:p>
+        </p:txBody>
+      </p:sp>
+    </p:spTree>
+  </p:cSld>
+  <p:timing>
+    <p:tnLst>
+      <p:par>
+        <p:cTn id="27" dur="indefinite" restart="never" nodeType="tmRoot">
+          <p:childTnLst>
+            <p:seq>
+              <p:cTn id="28" dur="indefinite" nodeType="mainSeq"/>
+              <p:prevCondLst>
+                <p:cond delay="0" evt="onPrev">
+                  <p:tgtEl>
+                    <p:sldTgt/>
+                  </p:tgtEl>
+                </p:cond>
+              </p:prevCondLst>
+              <p:nextCondLst>
+                <p:cond delay="0" evt="onNext">
+                  <p:tgtEl>
+                    <p:sldTgt/>
+                  </p:tgtEl>
+                </p:cond>
+              </p:nextCondLst>
+            </p:seq>
+          </p:childTnLst>
+        </p:cTn>
+      </p:par>
+    </p:tnLst>
+  </p:timing>
+</p:sld>
+</file>
+
+<file path=ppt/slides/slide15.xml><?xml version="1.0" encoding="utf-8"?>
+<p:sld xmlns:a="http://schemas.openxmlformats.org/drawingml/2006/main" xmlns:p="http://schemas.openxmlformats.org/presentationml/2006/main" xmlns:r="http://schemas.openxmlformats.org/officeDocument/2006/relationships" xmlns:p14="http://schemas.microsoft.com/office/powerpoint/2010/main" xmlns:p15="http://schemas.microsoft.com/office/powerpoint/2012/main" xmlns:mc="http://schemas.openxmlformats.org/markup-compatibility/2006">
+  <p:cSld>
+    <p:spTree>
+      <p:nvGrpSpPr>
+        <p:cNvPr id="1" name=""/>
+        <p:cNvGrpSpPr/>
+        <p:nvPr/>
+      </p:nvGrpSpPr>
+      <p:grpSpPr>
+        <a:xfrm>
+          <a:off x="0" y="0"/>
+          <a:ext cx="0" cy="0"/>
+          <a:chOff x="0" y="0"/>
+          <a:chExt cx="0" cy="0"/>
+        </a:xfrm>
+      </p:grpSpPr>
+      <p:sp>
+        <p:nvSpPr>
+          <p:cNvPr id="104" name="CustomShape 1"/>
+          <p:cNvSpPr/>
+          <p:nvPr/>
+        </p:nvSpPr>
+        <p:spPr>
+          <a:xfrm>
+            <a:off x="838080" y="365040"/>
+            <a:ext cx="10513800" cy="1323720"/>
+          </a:xfrm>
+          <a:prstGeom prst="rect">
+            <a:avLst/>
+          </a:prstGeom>
+          <a:noFill/>
+          <a:ln>
+            <a:noFill/>
+          </a:ln>
+        </p:spPr>
+        <p:style>
+          <a:lnRef idx="0"/>
+          <a:fillRef idx="0"/>
+          <a:effectRef idx="0"/>
+          <a:fontRef idx="minor"/>
+        </p:style>
+      </p:sp>
+      <p:sp>
+        <p:nvSpPr>
+          <p:cNvPr id="105" name="CustomShape 2"/>
+          <p:cNvSpPr/>
+          <p:nvPr/>
+        </p:nvSpPr>
+        <p:spPr>
+          <a:xfrm>
             <a:off x="838080" y="1825560"/>
-            <a:ext cx="10514160" cy="3492000"/>
+            <a:ext cx="10513800" cy="4349520"/>
+          </a:xfrm>
+          <a:prstGeom prst="rect">
+            <a:avLst/>
+          </a:prstGeom>
+          <a:noFill/>
+          <a:ln>
+            <a:noFill/>
+          </a:ln>
+        </p:spPr>
+        <p:style>
+          <a:lnRef idx="0"/>
+          <a:fillRef idx="0"/>
+          <a:effectRef idx="0"/>
+          <a:fontRef idx="minor"/>
+        </p:style>
+        <p:txBody>
+          <a:bodyPr lIns="90000" rIns="90000" tIns="45000" bIns="45000">
+            <a:normAutofit/>
+          </a:bodyPr>
+          <a:p>
+            <a:pPr marL="228600" indent="-226800">
+              <a:lnSpc>
+                <a:spcPct val="90000"/>
+              </a:lnSpc>
+              <a:spcBef>
+                <a:spcPts val="1001"/>
+              </a:spcBef>
+              <a:buClr>
+                <a:srgbClr val="c00000"/>
+              </a:buClr>
+              <a:buFont typeface="Arial"/>
+              <a:buChar char="•"/>
+            </a:pPr>
+            <a:r>
+              <a:rPr b="1" lang="en-US" sz="8800" spc="-1" strike="noStrike">
+                <a:solidFill>
+                  <a:srgbClr val="c00000"/>
+                </a:solidFill>
+                <a:latin typeface="Calibri"/>
+                <a:ea typeface="DejaVu Sans"/>
+              </a:rPr>
+              <a:t>Questions</a:t>
+            </a:r>
+            <a:endParaRPr b="0" lang="en-US" sz="8800" spc="-1" strike="noStrike">
+              <a:latin typeface="Arial"/>
+            </a:endParaRPr>
+          </a:p>
+        </p:txBody>
+      </p:sp>
+    </p:spTree>
+  </p:cSld>
+  <p:timing>
+    <p:tnLst>
+      <p:par>
+        <p:cTn id="29" dur="indefinite" restart="never" nodeType="tmRoot">
+          <p:childTnLst>
+            <p:seq>
+              <p:cTn id="30" dur="indefinite" nodeType="mainSeq"/>
+              <p:prevCondLst>
+                <p:cond delay="0" evt="onPrev">
+                  <p:tgtEl>
+                    <p:sldTgt/>
+                  </p:tgtEl>
+                </p:cond>
+              </p:prevCondLst>
+              <p:nextCondLst>
+                <p:cond delay="0" evt="onNext">
+                  <p:tgtEl>
+                    <p:sldTgt/>
+                  </p:tgtEl>
+                </p:cond>
+              </p:nextCondLst>
+            </p:seq>
+          </p:childTnLst>
+        </p:cTn>
+      </p:par>
+    </p:tnLst>
+  </p:timing>
+</p:sld>
+</file>
+
+<file path=ppt/slides/slide16.xml><?xml version="1.0" encoding="utf-8"?>
+<p:sld xmlns:a="http://schemas.openxmlformats.org/drawingml/2006/main" xmlns:p="http://schemas.openxmlformats.org/presentationml/2006/main" xmlns:r="http://schemas.openxmlformats.org/officeDocument/2006/relationships" xmlns:p14="http://schemas.microsoft.com/office/powerpoint/2010/main" xmlns:p15="http://schemas.microsoft.com/office/powerpoint/2012/main" xmlns:mc="http://schemas.openxmlformats.org/markup-compatibility/2006">
+  <p:cSld>
+    <p:spTree>
+      <p:nvGrpSpPr>
+        <p:cNvPr id="1" name=""/>
+        <p:cNvGrpSpPr/>
+        <p:nvPr/>
+      </p:nvGrpSpPr>
+      <p:grpSpPr>
+        <a:xfrm>
+          <a:off x="0" y="0"/>
+          <a:ext cx="0" cy="0"/>
+          <a:chOff x="0" y="0"/>
+          <a:chExt cx="0" cy="0"/>
+        </a:xfrm>
+      </p:grpSpPr>
+      <p:sp>
+        <p:nvSpPr>
+          <p:cNvPr id="106" name="CustomShape 1"/>
+          <p:cNvSpPr/>
+          <p:nvPr/>
+        </p:nvSpPr>
+        <p:spPr>
+          <a:xfrm>
+            <a:off x="838080" y="365040"/>
+            <a:ext cx="10513800" cy="1323720"/>
+          </a:xfrm>
+          <a:prstGeom prst="rect">
+            <a:avLst/>
+          </a:prstGeom>
+          <a:noFill/>
+          <a:ln>
+            <a:noFill/>
+          </a:ln>
+        </p:spPr>
+        <p:style>
+          <a:lnRef idx="0"/>
+          <a:fillRef idx="0"/>
+          <a:effectRef idx="0"/>
+          <a:fontRef idx="minor"/>
+        </p:style>
+      </p:sp>
+      <p:sp>
+        <p:nvSpPr>
+          <p:cNvPr id="107" name="CustomShape 2"/>
+          <p:cNvSpPr/>
+          <p:nvPr/>
+        </p:nvSpPr>
+        <p:spPr>
+          <a:xfrm>
+            <a:off x="838080" y="1825560"/>
+            <a:ext cx="10513800" cy="3491640"/>
           </a:xfrm>
           <a:prstGeom prst="rect">
             <a:avLst/>
@@ -3741,10 +4560,10 @@
   <p:timing>
     <p:tnLst>
       <p:par>
-        <p:cTn id="21" dur="indefinite" restart="never" nodeType="tmRoot">
+        <p:cTn id="31" dur="indefinite" restart="never" nodeType="tmRoot">
           <p:childTnLst>
             <p:seq>
-              <p:cTn id="22" dur="indefinite" nodeType="mainSeq"/>
+              <p:cTn id="32" dur="indefinite" nodeType="mainSeq"/>
               <p:prevCondLst>
                 <p:cond delay="0" evt="onPrev">
                   <p:tgtEl>
@@ -3794,7 +4613,7 @@
         <p:spPr>
           <a:xfrm>
             <a:off x="838080" y="365040"/>
-            <a:ext cx="10514160" cy="1324080"/>
+            <a:ext cx="10513800" cy="1323720"/>
           </a:xfrm>
           <a:prstGeom prst="rect">
             <a:avLst/>
@@ -3843,7 +4662,7 @@
         <p:spPr>
           <a:xfrm>
             <a:off x="609480" y="1604520"/>
-            <a:ext cx="10971720" cy="3976560"/>
+            <a:ext cx="10971360" cy="3976200"/>
           </a:xfrm>
           <a:prstGeom prst="rect">
             <a:avLst/>
@@ -3864,7 +4683,7 @@
             <a:normAutofit/>
           </a:bodyPr>
           <a:p>
-            <a:pPr marL="432000" indent="-323280">
+            <a:pPr marL="432000" indent="-322920">
               <a:lnSpc>
                 <a:spcPct val="100000"/>
               </a:lnSpc>
@@ -3893,7 +4712,7 @@
             </a:endParaRPr>
           </a:p>
           <a:p>
-            <a:pPr marL="432000" indent="-323280">
+            <a:pPr marL="432000" indent="-322920">
               <a:lnSpc>
                 <a:spcPct val="100000"/>
               </a:lnSpc>
@@ -3922,7 +4741,7 @@
             </a:endParaRPr>
           </a:p>
           <a:p>
-            <a:pPr marL="432000" indent="-323280">
+            <a:pPr marL="432000" indent="-322920">
               <a:lnSpc>
                 <a:spcPct val="100000"/>
               </a:lnSpc>
@@ -3951,7 +4770,7 @@
             </a:endParaRPr>
           </a:p>
           <a:p>
-            <a:pPr marL="432000" indent="-323280">
+            <a:pPr marL="432000" indent="-322920">
               <a:lnSpc>
                 <a:spcPct val="100000"/>
               </a:lnSpc>
@@ -4039,7 +4858,7 @@
         <p:spPr>
           <a:xfrm>
             <a:off x="63000" y="38160"/>
-            <a:ext cx="10533240" cy="1363320"/>
+            <a:ext cx="10532880" cy="1362960"/>
           </a:xfrm>
           <a:prstGeom prst="rect">
             <a:avLst/>
@@ -4079,6 +4898,26 @@
               <a:latin typeface="Arial"/>
             </a:endParaRPr>
           </a:p>
+          <a:p>
+            <a:pPr>
+              <a:lnSpc>
+                <a:spcPct val="90000"/>
+              </a:lnSpc>
+            </a:pPr>
+            <a:r>
+              <a:rPr b="1" lang="en-US" sz="2400" spc="-1" strike="noStrike">
+                <a:solidFill>
+                  <a:srgbClr val="c00000"/>
+                </a:solidFill>
+                <a:latin typeface="Calibri"/>
+                <a:ea typeface="DejaVu Sans"/>
+              </a:rPr>
+              <a:t>Percentage of missing values</a:t>
+            </a:r>
+            <a:endParaRPr b="0" lang="en-US" sz="2400" spc="-1" strike="noStrike">
+              <a:latin typeface="Arial"/>
+            </a:endParaRPr>
+          </a:p>
         </p:txBody>
       </p:sp>
       <p:pic>
@@ -4094,7 +4933,7 @@
         <p:spPr>
           <a:xfrm>
             <a:off x="182880" y="1280160"/>
-            <a:ext cx="11795760" cy="5397480"/>
+            <a:ext cx="11795400" cy="5397120"/>
           </a:xfrm>
           <a:prstGeom prst="rect">
             <a:avLst/>
@@ -4162,7 +5001,7 @@
         <p:spPr>
           <a:xfrm>
             <a:off x="171000" y="-105840"/>
-            <a:ext cx="10533240" cy="1363320"/>
+            <a:ext cx="10532880" cy="1362960"/>
           </a:xfrm>
           <a:prstGeom prst="rect">
             <a:avLst/>
@@ -4202,6 +5041,26 @@
               <a:latin typeface="Arial"/>
             </a:endParaRPr>
           </a:p>
+          <a:p>
+            <a:pPr>
+              <a:lnSpc>
+                <a:spcPct val="90000"/>
+              </a:lnSpc>
+            </a:pPr>
+            <a:r>
+              <a:rPr b="1" lang="en-US" sz="2400" spc="-1" strike="noStrike">
+                <a:solidFill>
+                  <a:srgbClr val="c00000"/>
+                </a:solidFill>
+                <a:latin typeface="Calibri"/>
+                <a:ea typeface="DejaVu Sans"/>
+              </a:rPr>
+              <a:t>Percentage of missing values</a:t>
+            </a:r>
+            <a:endParaRPr b="0" lang="en-US" sz="2400" spc="-1" strike="noStrike">
+              <a:latin typeface="Arial"/>
+            </a:endParaRPr>
+          </a:p>
         </p:txBody>
       </p:sp>
       <p:pic>
@@ -4217,7 +5076,7 @@
         <p:spPr>
           <a:xfrm>
             <a:off x="1470240" y="1005840"/>
-            <a:ext cx="9143640" cy="5303520"/>
+            <a:ext cx="9143280" cy="5303160"/>
           </a:xfrm>
           <a:prstGeom prst="rect">
             <a:avLst/>
@@ -4285,7 +5144,7 @@
         <p:spPr>
           <a:xfrm>
             <a:off x="99000" y="-249840"/>
-            <a:ext cx="10533240" cy="1363320"/>
+            <a:ext cx="10532880" cy="1362960"/>
           </a:xfrm>
           <a:prstGeom prst="rect">
             <a:avLst/>
@@ -4325,6 +5184,26 @@
               <a:latin typeface="Arial"/>
             </a:endParaRPr>
           </a:p>
+          <a:p>
+            <a:pPr>
+              <a:lnSpc>
+                <a:spcPct val="90000"/>
+              </a:lnSpc>
+            </a:pPr>
+            <a:r>
+              <a:rPr b="1" lang="en-US" sz="2400" spc="-1" strike="noStrike">
+                <a:solidFill>
+                  <a:srgbClr val="c00000"/>
+                </a:solidFill>
+                <a:latin typeface="Calibri"/>
+                <a:ea typeface="DejaVu Sans"/>
+              </a:rPr>
+              <a:t>Outliers and quantitative variables</a:t>
+            </a:r>
+            <a:endParaRPr b="0" lang="en-US" sz="2400" spc="-1" strike="noStrike">
+              <a:latin typeface="Arial"/>
+            </a:endParaRPr>
+          </a:p>
         </p:txBody>
       </p:sp>
       <p:pic>
@@ -4339,8 +5218,8 @@
         </p:blipFill>
         <p:spPr>
           <a:xfrm>
-            <a:off x="176040" y="738000"/>
-            <a:ext cx="11877480" cy="6134760"/>
+            <a:off x="176040" y="846000"/>
+            <a:ext cx="11877120" cy="6134400"/>
           </a:xfrm>
           <a:prstGeom prst="rect">
             <a:avLst/>
@@ -4399,16 +5278,39 @@
           <a:chExt cx="0" cy="0"/>
         </a:xfrm>
       </p:grpSpPr>
-      <p:sp>
-        <p:nvSpPr>
-          <p:cNvPr id="88" name="CustomShape 1"/>
+      <p:pic>
+        <p:nvPicPr>
+          <p:cNvPr id="88" name="" descr=""/>
+          <p:cNvPicPr/>
+          <p:nvPr/>
+        </p:nvPicPr>
+        <p:blipFill>
+          <a:blip r:embed="rId1"/>
+          <a:stretch/>
+        </p:blipFill>
+        <p:spPr>
+          <a:xfrm>
+            <a:off x="127800" y="664200"/>
+            <a:ext cx="11877120" cy="6134760"/>
+          </a:xfrm>
+          <a:prstGeom prst="rect">
+            <a:avLst/>
+          </a:prstGeom>
+          <a:ln>
+            <a:noFill/>
+          </a:ln>
+        </p:spPr>
+      </p:pic>
+      <p:sp>
+        <p:nvSpPr>
+          <p:cNvPr id="89" name="CustomShape 1"/>
           <p:cNvSpPr/>
           <p:nvPr/>
         </p:nvSpPr>
         <p:spPr>
           <a:xfrm>
             <a:off x="99000" y="-249840"/>
-            <a:ext cx="10533240" cy="1363320"/>
+            <a:ext cx="10532880" cy="1362960"/>
           </a:xfrm>
           <a:prstGeom prst="rect">
             <a:avLst/>
@@ -4448,31 +5350,28 @@
               <a:latin typeface="Arial"/>
             </a:endParaRPr>
           </a:p>
-        </p:txBody>
-      </p:sp>
-      <p:pic>
-        <p:nvPicPr>
-          <p:cNvPr id="89" name="" descr=""/>
-          <p:cNvPicPr/>
-          <p:nvPr/>
-        </p:nvPicPr>
-        <p:blipFill>
-          <a:blip r:embed="rId1"/>
-          <a:stretch/>
-        </p:blipFill>
-        <p:spPr>
-          <a:xfrm>
-            <a:off x="127800" y="664200"/>
-            <a:ext cx="11877480" cy="6135120"/>
-          </a:xfrm>
-          <a:prstGeom prst="rect">
-            <a:avLst/>
-          </a:prstGeom>
-          <a:ln>
-            <a:noFill/>
-          </a:ln>
-        </p:spPr>
-      </p:pic>
+          <a:p>
+            <a:pPr>
+              <a:lnSpc>
+                <a:spcPct val="90000"/>
+              </a:lnSpc>
+            </a:pPr>
+            <a:r>
+              <a:rPr b="1" lang="en-US" sz="2400" spc="-1" strike="noStrike">
+                <a:solidFill>
+                  <a:srgbClr val="c00000"/>
+                </a:solidFill>
+                <a:latin typeface="Calibri"/>
+                <a:ea typeface="DejaVu Sans"/>
+              </a:rPr>
+              <a:t>Qualitative variable</a:t>
+            </a:r>
+            <a:endParaRPr b="0" lang="en-US" sz="2400" spc="-1" strike="noStrike">
+              <a:latin typeface="Arial"/>
+            </a:endParaRPr>
+          </a:p>
+        </p:txBody>
+      </p:sp>
     </p:spTree>
   </p:cSld>
   <p:timing>
@@ -4522,39 +5421,16 @@
           <a:chExt cx="0" cy="0"/>
         </a:xfrm>
       </p:grpSpPr>
-      <p:pic>
-        <p:nvPicPr>
-          <p:cNvPr id="90" name="" descr=""/>
-          <p:cNvPicPr/>
-          <p:nvPr/>
-        </p:nvPicPr>
-        <p:blipFill>
-          <a:blip r:embed="rId1"/>
-          <a:stretch/>
-        </p:blipFill>
-        <p:spPr>
-          <a:xfrm>
-            <a:off x="633240" y="456480"/>
-            <a:ext cx="11877480" cy="6135120"/>
-          </a:xfrm>
-          <a:prstGeom prst="rect">
-            <a:avLst/>
-          </a:prstGeom>
-          <a:ln>
-            <a:noFill/>
-          </a:ln>
-        </p:spPr>
-      </p:pic>
-      <p:sp>
-        <p:nvSpPr>
-          <p:cNvPr id="91" name="CustomShape 1"/>
+      <p:sp>
+        <p:nvSpPr>
+          <p:cNvPr id="90" name="CustomShape 1"/>
           <p:cNvSpPr/>
           <p:nvPr/>
         </p:nvSpPr>
         <p:spPr>
           <a:xfrm>
             <a:off x="99000" y="-249840"/>
-            <a:ext cx="10533240" cy="1363320"/>
+            <a:ext cx="10532880" cy="1362960"/>
           </a:xfrm>
           <a:prstGeom prst="rect">
             <a:avLst/>
@@ -4581,36 +5457,36 @@
               </a:lnSpc>
             </a:pPr>
             <a:r>
-              <a:rPr b="1" lang="en-US" sz="3600" spc="-1" strike="noStrike">
+              <a:rPr b="1" lang="en-US" sz="4800" spc="-1" strike="noStrike">
                 <a:solidFill>
                   <a:srgbClr val="c00000"/>
                 </a:solidFill>
                 <a:latin typeface="Calibri"/>
                 <a:ea typeface="DejaVu Sans"/>
               </a:rPr>
-              <a:t>Data Visualization and </a:t>
+              <a:t>Data Cleaning and Analysis:</a:t>
             </a:r>
+            <a:endParaRPr b="0" lang="en-US" sz="4800" spc="-1" strike="noStrike">
+              <a:latin typeface="Arial"/>
+            </a:endParaRPr>
+          </a:p>
+          <a:p>
+            <a:pPr>
+              <a:lnSpc>
+                <a:spcPct val="90000"/>
+              </a:lnSpc>
+            </a:pPr>
             <a:r>
-              <a:rPr b="1" lang="en-US" sz="3600" spc="-1" strike="noStrike">
+              <a:rPr b="1" lang="en-US" sz="2400" spc="-1" strike="noStrike">
                 <a:solidFill>
                   <a:srgbClr val="c00000"/>
                 </a:solidFill>
                 <a:latin typeface="Calibri"/>
                 <a:ea typeface="DejaVu Sans"/>
               </a:rPr>
-              <a:t>Interpretation</a:t>
+              <a:t>Correlation among variable</a:t>
             </a:r>
-            <a:r>
-              <a:rPr b="1" lang="en-US" sz="3600" spc="-1" strike="noStrike">
-                <a:solidFill>
-                  <a:srgbClr val="c00000"/>
-                </a:solidFill>
-                <a:latin typeface="Calibri"/>
-                <a:ea typeface="DejaVu Sans"/>
-              </a:rPr>
-              <a:t>:</a:t>
-            </a:r>
-            <a:endParaRPr b="0" lang="en-US" sz="3600" spc="-1" strike="noStrike">
+            <a:endParaRPr b="0" lang="en-US" sz="2400" spc="-1" strike="noStrike">
               <a:latin typeface="Arial"/>
             </a:endParaRPr>
           </a:p>
@@ -4667,14 +5543,14 @@
       </p:grpSpPr>
       <p:sp>
         <p:nvSpPr>
-          <p:cNvPr id="92" name="CustomShape 1"/>
+          <p:cNvPr id="91" name="CustomShape 1"/>
           <p:cNvSpPr/>
           <p:nvPr/>
         </p:nvSpPr>
         <p:spPr>
           <a:xfrm>
-            <a:off x="838080" y="365040"/>
-            <a:ext cx="10514160" cy="1324080"/>
+            <a:off x="99000" y="-249840"/>
+            <a:ext cx="10532880" cy="1362960"/>
           </a:xfrm>
           <a:prstGeom prst="rect">
             <a:avLst/>
@@ -4691,7 +5567,9 @@
           <a:fontRef idx="minor"/>
         </p:style>
         <p:txBody>
-          <a:bodyPr lIns="90000" rIns="90000" tIns="45000" bIns="45000" anchor="ctr"/>
+          <a:bodyPr lIns="90000" rIns="90000" tIns="45000" bIns="45000" anchor="ctr">
+            <a:normAutofit/>
+          </a:bodyPr>
           <a:p>
             <a:pPr>
               <a:lnSpc>
@@ -4699,150 +5577,36 @@
               </a:lnSpc>
             </a:pPr>
             <a:r>
-              <a:rPr b="1" lang="en-US" sz="4400" spc="-1" strike="noStrike">
+              <a:rPr b="1" lang="en-US" sz="4800" spc="-1" strike="noStrike">
                 <a:solidFill>
                   <a:srgbClr val="c00000"/>
                 </a:solidFill>
                 <a:latin typeface="Calibri"/>
                 <a:ea typeface="DejaVu Sans"/>
               </a:rPr>
-              <a:t>Conclusion:</a:t>
+              <a:t>Data Cleaning and Analysis:</a:t>
             </a:r>
-            <a:endParaRPr b="0" lang="en-US" sz="4400" spc="-1" strike="noStrike">
-              <a:latin typeface="Arial"/>
-            </a:endParaRPr>
-          </a:p>
-        </p:txBody>
-      </p:sp>
-      <p:sp>
-        <p:nvSpPr>
-          <p:cNvPr id="93" name="CustomShape 2"/>
-          <p:cNvSpPr/>
-          <p:nvPr/>
-        </p:nvSpPr>
-        <p:spPr>
-          <a:xfrm>
-            <a:off x="838080" y="1690560"/>
-            <a:ext cx="10514160" cy="4484880"/>
-          </a:xfrm>
-          <a:prstGeom prst="rect">
-            <a:avLst/>
-          </a:prstGeom>
-          <a:noFill/>
-          <a:ln>
-            <a:noFill/>
-          </a:ln>
-        </p:spPr>
-        <p:style>
-          <a:lnRef idx="0"/>
-          <a:fillRef idx="0"/>
-          <a:effectRef idx="0"/>
-          <a:fontRef idx="minor"/>
-        </p:style>
-        <p:txBody>
-          <a:bodyPr lIns="90000" rIns="90000" tIns="45000" bIns="45000"/>
-          <a:p>
-            <a:pPr marL="228600" indent="-227160">
+            <a:endParaRPr b="0" lang="en-US" sz="4800" spc="-1" strike="noStrike">
+              <a:latin typeface="Arial"/>
+            </a:endParaRPr>
+          </a:p>
+          <a:p>
+            <a:pPr>
               <a:lnSpc>
                 <a:spcPct val="90000"/>
               </a:lnSpc>
-              <a:spcBef>
-                <a:spcPts val="1001"/>
-              </a:spcBef>
-              <a:buClr>
-                <a:srgbClr val="000000"/>
-              </a:buClr>
-              <a:buFont typeface="Arial"/>
-              <a:buChar char="•"/>
             </a:pPr>
             <a:r>
-              <a:rPr b="1" lang="en-US" sz="2800" spc="-1" strike="noStrike">
+              <a:rPr b="1" lang="en-US" sz="2400" spc="-1" strike="noStrike">
                 <a:solidFill>
-                  <a:srgbClr val="000000"/>
+                  <a:srgbClr val="c00000"/>
                 </a:solidFill>
                 <a:latin typeface="Calibri"/>
                 <a:ea typeface="DejaVu Sans"/>
               </a:rPr>
-              <a:t>Brussels is the most expensive region in Belgium for houses and apartment.  </a:t>
+              <a:t>Correlation among variable</a:t>
             </a:r>
-            <a:r>
-              <a:rPr b="0" lang="en-US" sz="2800" spc="-1" strike="noStrike">
-                <a:solidFill>
-                  <a:srgbClr val="000000"/>
-                </a:solidFill>
-                <a:latin typeface="Calibri"/>
-                <a:ea typeface="DejaVu Sans"/>
-              </a:rPr>
-              <a:t>	</a:t>
-            </a:r>
-            <a:endParaRPr b="0" lang="en-US" sz="2800" spc="-1" strike="noStrike">
-              <a:latin typeface="Arial"/>
-            </a:endParaRPr>
-          </a:p>
-          <a:p>
-            <a:pPr>
-              <a:lnSpc>
-                <a:spcPct val="90000"/>
-              </a:lnSpc>
-              <a:spcBef>
-                <a:spcPts val="1001"/>
-              </a:spcBef>
-            </a:pPr>
-            <a:endParaRPr b="0" lang="en-US" sz="2800" spc="-1" strike="noStrike">
-              <a:latin typeface="Arial"/>
-            </a:endParaRPr>
-          </a:p>
-          <a:p>
-            <a:pPr marL="228600" indent="-227160">
-              <a:lnSpc>
-                <a:spcPct val="90000"/>
-              </a:lnSpc>
-              <a:spcBef>
-                <a:spcPts val="1001"/>
-              </a:spcBef>
-              <a:buClr>
-                <a:srgbClr val="000000"/>
-              </a:buClr>
-              <a:buFont typeface="Arial"/>
-              <a:buChar char="•"/>
-            </a:pPr>
-            <a:r>
-              <a:rPr b="0" lang="en-US" sz="2800" spc="-1" strike="noStrike">
-                <a:solidFill>
-                  <a:srgbClr val="000000"/>
-                </a:solidFill>
-                <a:latin typeface="Calibri"/>
-                <a:ea typeface="DejaVu Sans"/>
-              </a:rPr>
-              <a:t> </a:t>
-            </a:r>
-            <a:endParaRPr b="0" lang="en-US" sz="2800" spc="-1" strike="noStrike">
-              <a:latin typeface="Arial"/>
-            </a:endParaRPr>
-          </a:p>
-          <a:p>
-            <a:pPr>
-              <a:lnSpc>
-                <a:spcPct val="90000"/>
-              </a:lnSpc>
-              <a:spcBef>
-                <a:spcPts val="1001"/>
-              </a:spcBef>
-            </a:pPr>
-            <a:endParaRPr b="0" lang="en-US" sz="2800" spc="-1" strike="noStrike">
-              <a:latin typeface="Arial"/>
-            </a:endParaRPr>
-          </a:p>
-          <a:p>
-            <a:pPr>
-              <a:lnSpc>
-                <a:spcPct val="90000"/>
-              </a:lnSpc>
-              <a:spcBef>
-                <a:spcPts val="1001"/>
-              </a:spcBef>
-            </a:pPr>
-            <a:endParaRPr b="0" lang="en-US" sz="2800" spc="-1" strike="noStrike">
+            <a:endParaRPr b="0" lang="en-US" sz="2400" spc="-1" strike="noStrike">
               <a:latin typeface="Arial"/>
             </a:endParaRPr>
           </a:p>
@@ -4897,16 +5661,39 @@
           <a:chExt cx="0" cy="0"/>
         </a:xfrm>
       </p:grpSpPr>
-      <p:sp>
-        <p:nvSpPr>
-          <p:cNvPr id="94" name="CustomShape 1"/>
+      <p:pic>
+        <p:nvPicPr>
+          <p:cNvPr id="92" name="" descr=""/>
+          <p:cNvPicPr/>
+          <p:nvPr/>
+        </p:nvPicPr>
+        <p:blipFill>
+          <a:blip r:embed="rId1"/>
+          <a:stretch/>
+        </p:blipFill>
+        <p:spPr>
+          <a:xfrm>
+            <a:off x="633240" y="456480"/>
+            <a:ext cx="11877120" cy="6134760"/>
+          </a:xfrm>
+          <a:prstGeom prst="rect">
+            <a:avLst/>
+          </a:prstGeom>
+          <a:ln>
+            <a:noFill/>
+          </a:ln>
+        </p:spPr>
+      </p:pic>
+      <p:sp>
+        <p:nvSpPr>
+          <p:cNvPr id="93" name="CustomShape 1"/>
           <p:cNvSpPr/>
           <p:nvPr/>
         </p:nvSpPr>
         <p:spPr>
           <a:xfrm>
-            <a:off x="838080" y="365040"/>
-            <a:ext cx="10514160" cy="1324080"/>
+            <a:off x="99000" y="-249840"/>
+            <a:ext cx="10532880" cy="1362960"/>
           </a:xfrm>
           <a:prstGeom prst="rect">
             <a:avLst/>
@@ -4922,58 +5709,51 @@
           <a:effectRef idx="0"/>
           <a:fontRef idx="minor"/>
         </p:style>
-      </p:sp>
-      <p:sp>
-        <p:nvSpPr>
-          <p:cNvPr id="95" name="CustomShape 2"/>
-          <p:cNvSpPr/>
-          <p:nvPr/>
-        </p:nvSpPr>
-        <p:spPr>
-          <a:xfrm>
-            <a:off x="838080" y="1825560"/>
-            <a:ext cx="10514160" cy="4349880"/>
-          </a:xfrm>
-          <a:prstGeom prst="rect">
-            <a:avLst/>
-          </a:prstGeom>
-          <a:noFill/>
-          <a:ln>
-            <a:noFill/>
-          </a:ln>
-        </p:spPr>
-        <p:style>
-          <a:lnRef idx="0"/>
-          <a:fillRef idx="0"/>
-          <a:effectRef idx="0"/>
-          <a:fontRef idx="minor"/>
-        </p:style>
-      </p:sp>
-      <p:sp>
-        <p:nvSpPr>
-          <p:cNvPr id="96" name="CustomShape 3"/>
-          <p:cNvSpPr/>
-          <p:nvPr/>
-        </p:nvSpPr>
-        <p:spPr>
-          <a:xfrm>
-            <a:off x="1463040" y="2152800"/>
-            <a:ext cx="2376720" cy="1686960"/>
-          </a:xfrm>
-          <a:prstGeom prst="rect">
-            <a:avLst/>
-          </a:prstGeom>
-          <a:noFill/>
-          <a:ln>
-            <a:noFill/>
-          </a:ln>
-        </p:spPr>
-        <p:style>
-          <a:lnRef idx="0"/>
-          <a:fillRef idx="0"/>
-          <a:effectRef idx="0"/>
-          <a:fontRef idx="minor"/>
-        </p:style>
+        <p:txBody>
+          <a:bodyPr lIns="90000" rIns="90000" tIns="45000" bIns="45000" anchor="ctr">
+            <a:normAutofit/>
+          </a:bodyPr>
+          <a:p>
+            <a:pPr>
+              <a:lnSpc>
+                <a:spcPct val="90000"/>
+              </a:lnSpc>
+            </a:pPr>
+            <a:r>
+              <a:rPr b="1" lang="en-US" sz="3600" spc="-1" strike="noStrike">
+                <a:solidFill>
+                  <a:srgbClr val="c00000"/>
+                </a:solidFill>
+                <a:latin typeface="Calibri"/>
+                <a:ea typeface="DejaVu Sans"/>
+              </a:rPr>
+              <a:t>Data Visualization and Interpretation:</a:t>
+            </a:r>
+            <a:endParaRPr b="0" lang="en-US" sz="3600" spc="-1" strike="noStrike">
+              <a:latin typeface="Arial"/>
+            </a:endParaRPr>
+          </a:p>
+          <a:p>
+            <a:pPr>
+              <a:lnSpc>
+                <a:spcPct val="90000"/>
+              </a:lnSpc>
+            </a:pPr>
+            <a:r>
+              <a:rPr b="1" lang="en-US" sz="2400" spc="-1" strike="noStrike">
+                <a:solidFill>
+                  <a:srgbClr val="c00000"/>
+                </a:solidFill>
+                <a:latin typeface="Calibri"/>
+                <a:ea typeface="DejaVu Sans"/>
+              </a:rPr>
+              <a:t>Price per region</a:t>
+            </a:r>
+            <a:endParaRPr b="0" lang="en-US" sz="2400" spc="-1" strike="noStrike">
+              <a:latin typeface="Arial"/>
+            </a:endParaRPr>
+          </a:p>
+        </p:txBody>
       </p:sp>
     </p:spTree>
   </p:cSld>

</xml_diff>